<commit_message>
Fixed typos in presentations. Fixed a bug causing dev lunch and model review meeting pages to not link in the side navigation. Added presentations to other resources.
</commit_message>
<xml_diff>
--- a/docs/static/presentations/oscal-ap-ar-poam-v3.pptx
+++ b/docs/static/presentations/oscal-ap-ar-poam-v3.pptx
@@ -661,7 +661,7 @@
           <a:p>
             <a:fld id="{A5529470-F7A8-4398-A8EE-7FA53A742130}" type="datetimeFigureOut">
               <a:rPr lang="en-US" smtClean="0"/>
-              <a:t>7/29/2020</a:t>
+              <a:t>7/30/2020</a:t>
             </a:fld>
             <a:endParaRPr lang="en-US"/>
           </a:p>
@@ -1222,7 +1222,7 @@
           <a:p>
             <a:fld id="{3A0ECD62-D53C-4B1C-A161-36F5266F165E}" type="datetime1">
               <a:rPr lang="en-US" smtClean="0"/>
-              <a:t>7/29/2020</a:t>
+              <a:t>7/30/2020</a:t>
             </a:fld>
             <a:endParaRPr lang="en-US"/>
           </a:p>
@@ -1560,7 +1560,7 @@
           <a:p>
             <a:fld id="{094E981E-B08F-4856-8D63-A350864EE466}" type="datetime1">
               <a:rPr lang="en-US" smtClean="0"/>
-              <a:t>7/29/2020</a:t>
+              <a:t>7/30/2020</a:t>
             </a:fld>
             <a:endParaRPr lang="en-US"/>
           </a:p>
@@ -1905,7 +1905,7 @@
           <a:p>
             <a:fld id="{AEA55179-344B-409D-9D49-2F865998A651}" type="datetime1">
               <a:rPr lang="en-US" smtClean="0"/>
-              <a:t>7/29/2020</a:t>
+              <a:t>7/30/2020</a:t>
             </a:fld>
             <a:endParaRPr lang="en-US"/>
           </a:p>
@@ -2243,7 +2243,7 @@
           <a:p>
             <a:fld id="{5BE34584-67BC-4477-8C8A-7EC8D88E3893}" type="datetime1">
               <a:rPr lang="en-US" smtClean="0"/>
-              <a:t>7/29/2020</a:t>
+              <a:t>7/30/2020</a:t>
             </a:fld>
             <a:endParaRPr lang="en-US"/>
           </a:p>
@@ -2644,7 +2644,7 @@
           <a:p>
             <a:fld id="{2CC85A34-25CF-47D2-ACF5-CB08A7038568}" type="datetime1">
               <a:rPr lang="en-US" smtClean="0"/>
-              <a:t>7/29/2020</a:t>
+              <a:t>7/30/2020</a:t>
             </a:fld>
             <a:endParaRPr lang="en-US"/>
           </a:p>
@@ -2980,7 +2980,7 @@
           <a:p>
             <a:fld id="{AE513C0E-443E-4A29-AC73-09213761DEA6}" type="datetime1">
               <a:rPr lang="en-US" smtClean="0"/>
-              <a:t>7/29/2020</a:t>
+              <a:t>7/30/2020</a:t>
             </a:fld>
             <a:endParaRPr lang="en-US"/>
           </a:p>
@@ -3300,7 +3300,7 @@
           <a:p>
             <a:fld id="{7E4E5EB2-70F5-485F-A3B7-447265FD33A1}" type="datetime1">
               <a:rPr lang="en-US" smtClean="0"/>
-              <a:t>7/29/2020</a:t>
+              <a:t>7/30/2020</a:t>
             </a:fld>
             <a:endParaRPr lang="en-US"/>
           </a:p>
@@ -3696,7 +3696,7 @@
           <a:p>
             <a:fld id="{20EC1EC6-9490-4F3E-9451-807B4A4A4480}" type="datetime1">
               <a:rPr lang="en-US" smtClean="0"/>
-              <a:t>7/29/2020</a:t>
+              <a:t>7/30/2020</a:t>
             </a:fld>
             <a:endParaRPr lang="en-US"/>
           </a:p>
@@ -3953,7 +3953,7 @@
           <a:p>
             <a:fld id="{DA2FDD43-E092-4EE0-A4FB-0A433C09A57F}" type="datetime1">
               <a:rPr lang="en-US" smtClean="0"/>
-              <a:t>7/29/2020</a:t>
+              <a:t>7/30/2020</a:t>
             </a:fld>
             <a:endParaRPr lang="en-US"/>
           </a:p>
@@ -4215,7 +4215,7 @@
           <a:p>
             <a:fld id="{C5B3B320-1390-4058-A5C1-64E4789F10F3}" type="datetime1">
               <a:rPr lang="en-US" smtClean="0"/>
-              <a:t>7/29/2020</a:t>
+              <a:t>7/30/2020</a:t>
             </a:fld>
             <a:endParaRPr lang="en-US"/>
           </a:p>
@@ -4477,7 +4477,7 @@
           <a:p>
             <a:fld id="{1FFB48BB-2FEA-45E4-8475-C13EB5303665}" type="datetime1">
               <a:rPr lang="en-US" smtClean="0"/>
-              <a:t>7/29/2020</a:t>
+              <a:t>7/30/2020</a:t>
             </a:fld>
             <a:endParaRPr lang="en-US"/>
           </a:p>
@@ -4572,7 +4572,7 @@
           <a:p>
             <a:fld id="{745DA0C8-6E1B-4BB8-980D-2FD8617F722B}" type="datetime1">
               <a:rPr lang="en-US" smtClean="0"/>
-              <a:t>7/29/2020</a:t>
+              <a:t>7/30/2020</a:t>
             </a:fld>
             <a:endParaRPr lang="en-US"/>
           </a:p>
@@ -5026,7 +5026,7 @@
           <a:p>
             <a:fld id="{F3268E0D-E29A-487C-BA79-4B5B5992A623}" type="datetime1">
               <a:rPr lang="en-US" smtClean="0"/>
-              <a:t>7/29/2020</a:t>
+              <a:t>7/30/2020</a:t>
             </a:fld>
             <a:endParaRPr lang="en-US"/>
           </a:p>
@@ -5349,7 +5349,7 @@
           <a:p>
             <a:fld id="{A60176B0-24AE-4431-99F9-C59EB1ABF796}" type="datetime1">
               <a:rPr lang="en-US" smtClean="0"/>
-              <a:t>7/29/2020</a:t>
+              <a:t>7/30/2020</a:t>
             </a:fld>
             <a:endParaRPr lang="en-US"/>
           </a:p>
@@ -5673,7 +5673,7 @@
           <a:p>
             <a:fld id="{32A96F2C-23C5-44FA-ADB3-C5CD7E8AB19E}" type="datetime1">
               <a:rPr lang="en-US" smtClean="0"/>
-              <a:t>7/29/2020</a:t>
+              <a:t>7/30/2020</a:t>
             </a:fld>
             <a:endParaRPr lang="en-US"/>
           </a:p>
@@ -6004,7 +6004,7 @@
           <a:p>
             <a:fld id="{984309DC-CB83-4640-AB9C-48DAEACD4B19}" type="datetime1">
               <a:rPr lang="en-US" smtClean="0"/>
-              <a:t>7/29/2020</a:t>
+              <a:t>7/30/2020</a:t>
             </a:fld>
             <a:endParaRPr lang="en-US"/>
           </a:p>
@@ -6615,7 +6615,7 @@
           <a:p>
             <a:fld id="{4518588B-9E26-4774-BCE2-ABE3DBC3A586}" type="datetime1">
               <a:rPr lang="en-US" smtClean="0"/>
-              <a:t>7/29/2020</a:t>
+              <a:t>7/30/2020</a:t>
             </a:fld>
             <a:endParaRPr lang="en-US"/>
           </a:p>
@@ -6820,7 +6820,7 @@
           <a:p>
             <a:fld id="{F971B097-8B27-43BB-95B2-DE6FA28AF0EE}" type="datetime1">
               <a:rPr lang="en-US" smtClean="0"/>
-              <a:t>7/29/2020</a:t>
+              <a:t>7/30/2020</a:t>
             </a:fld>
             <a:endParaRPr lang="en-US"/>
           </a:p>
@@ -6997,7 +6997,7 @@
           <a:p>
             <a:fld id="{506A1DAC-9BC9-4E94-ACA5-C75B424E35EC}" type="datetime1">
               <a:rPr lang="en-US" smtClean="0"/>
-              <a:t>7/29/2020</a:t>
+              <a:t>7/30/2020</a:t>
             </a:fld>
             <a:endParaRPr lang="en-US"/>
           </a:p>
@@ -9109,7 +9109,7 @@
           <a:p>
             <a:fld id="{6978CC70-F3CB-4DCC-8C5B-A025E3D4DA1A}" type="datetime1">
               <a:rPr lang="en-US" smtClean="0"/>
-              <a:t>7/29/2020</a:t>
+              <a:t>7/30/2020</a:t>
             </a:fld>
             <a:endParaRPr lang="en-US"/>
           </a:p>
@@ -13058,10 +13058,10 @@
       </p:sp>
       <p:pic>
         <p:nvPicPr>
-          <p:cNvPr id="4" name="Picture 3">
+          <p:cNvPr id="3" name="Picture 2">
             <a:extLst>
               <a:ext uri="{FF2B5EF4-FFF2-40B4-BE49-F238E27FC236}">
-                <a16:creationId xmlns:a16="http://schemas.microsoft.com/office/drawing/2014/main" id="{031E6843-713F-4B97-B1EA-D05D2AB17E03}"/>
+                <a16:creationId xmlns:a16="http://schemas.microsoft.com/office/drawing/2014/main" id="{D0D298A4-8FCD-48FF-AF69-C257CB313F20}"/>
               </a:ext>
             </a:extLst>
           </p:cNvPr>
@@ -13078,8 +13078,8 @@
         </p:blipFill>
         <p:spPr>
           <a:xfrm>
-            <a:off x="7182182" y="387960"/>
-            <a:ext cx="4535644" cy="4504471"/>
+            <a:off x="7124544" y="378723"/>
+            <a:ext cx="4535644" cy="4495885"/>
           </a:xfrm>
           <a:prstGeom prst="rect">
             <a:avLst/>

</xml_diff>